<commit_message>
adding more cities for Iktae's analysis
</commit_message>
<xml_diff>
--- a/Covid Project Final.pptx
+++ b/Covid Project Final.pptx
@@ -15,7 +15,10 @@
     <p:sldId id="265" r:id="rId9"/>
     <p:sldId id="267" r:id="rId10"/>
     <p:sldId id="266" r:id="rId11"/>
-    <p:sldId id="268" r:id="rId12"/>
+    <p:sldId id="269" r:id="rId12"/>
+    <p:sldId id="270" r:id="rId13"/>
+    <p:sldId id="268" r:id="rId14"/>
+    <p:sldId id="271" r:id="rId15"/>
   </p:sldIdLst>
   <p:sldSz cx="12192000" cy="6858000"/>
   <p:notesSz cx="6858000" cy="9144000"/>
@@ -3877,7 +3880,7 @@
         <p:spPr>
           <a:xfrm>
             <a:off x="429768" y="1747238"/>
-            <a:ext cx="6704891" cy="4469927"/>
+            <a:ext cx="6704890" cy="4469926"/>
           </a:xfrm>
           <a:prstGeom prst="rect">
             <a:avLst/>
@@ -3902,8 +3905,8 @@
         </p:nvSpPr>
         <p:spPr>
           <a:xfrm>
-            <a:off x="6814458" y="1629992"/>
-            <a:ext cx="4947774" cy="4587173"/>
+            <a:off x="7271656" y="1629992"/>
+            <a:ext cx="3946289" cy="4587173"/>
           </a:xfrm>
         </p:spPr>
         <p:txBody>
@@ -3919,52 +3922,308 @@
             <a:pPr marL="285750"/>
             <a:r>
               <a:rPr lang="en-US" sz="1800" dirty="0"/>
-              <a:t>The scatterplot shows the average daily temperature vs daily change in active cases for Seoul, Korea.</a:t>
+              <a:t>This scatterplot shows the average daily temperature vs daily change in active cases for Chicago, Illinois. (datapoints where daily change = 0 has been removed)</a:t>
             </a:r>
           </a:p>
           <a:p>
             <a:pPr marL="285750"/>
             <a:r>
               <a:rPr lang="en-US" sz="1800" dirty="0"/>
-              <a:t>Upon linear regression analysis, it seems like there may indeed be a negative correlation between temperature and daily change in the number of active cases.</a:t>
-            </a:r>
-          </a:p>
+              <a:t>Linear regression analysis for this country shows a very very slight negative correlation between temperature and daily change in the number of active cases.</a:t>
+            </a:r>
+          </a:p>
+          <a:p>
+            <a:pPr marL="57150" indent="0">
+              <a:buNone/>
+            </a:pPr>
+            <a:endParaRPr lang="en-US" sz="1800" dirty="0"/>
+          </a:p>
+        </p:txBody>
+      </p:sp>
+    </p:spTree>
+    <p:extLst>
+      <p:ext uri="{BB962C8B-B14F-4D97-AF65-F5344CB8AC3E}">
+        <p14:creationId xmlns:p14="http://schemas.microsoft.com/office/powerpoint/2010/main" val="4178732185"/>
+      </p:ext>
+    </p:extLst>
+  </p:cSld>
+  <p:clrMapOvr>
+    <a:masterClrMapping/>
+  </p:clrMapOvr>
+</p:sld>
+</file>
+
+<file path=ppt/slides/slide12.xml><?xml version="1.0" encoding="utf-8"?>
+<p:sld xmlns:a="http://schemas.openxmlformats.org/drawingml/2006/main" xmlns:r="http://schemas.openxmlformats.org/officeDocument/2006/relationships" xmlns:p="http://schemas.openxmlformats.org/presentationml/2006/main">
+  <p:cSld>
+    <p:spTree>
+      <p:nvGrpSpPr>
+        <p:cNvPr id="1" name=""/>
+        <p:cNvGrpSpPr/>
+        <p:nvPr/>
+      </p:nvGrpSpPr>
+      <p:grpSpPr>
+        <a:xfrm>
+          <a:off x="0" y="0"/>
+          <a:ext cx="0" cy="0"/>
+          <a:chOff x="0" y="0"/>
+          <a:chExt cx="0" cy="0"/>
+        </a:xfrm>
+      </p:grpSpPr>
+      <p:sp>
+        <p:nvSpPr>
+          <p:cNvPr id="2" name="Title 1">
+            <a:extLst>
+              <a:ext uri="{FF2B5EF4-FFF2-40B4-BE49-F238E27FC236}">
+                <a16:creationId xmlns:a16="http://schemas.microsoft.com/office/drawing/2014/main" id="{6C86CADF-F0CD-DC42-8789-D52C508FF3A7}"/>
+              </a:ext>
+            </a:extLst>
+          </p:cNvPr>
+          <p:cNvSpPr>
+            <a:spLocks noGrp="1"/>
+          </p:cNvSpPr>
+          <p:nvPr>
+            <p:ph type="title"/>
+          </p:nvPr>
+        </p:nvSpPr>
+        <p:spPr>
+          <a:xfrm>
+            <a:off x="429768" y="411480"/>
+            <a:ext cx="11201400" cy="1106424"/>
+          </a:xfrm>
+        </p:spPr>
+        <p:txBody>
+          <a:bodyPr vert="horz" lIns="91440" tIns="45720" rIns="91440" bIns="45720" rtlCol="0">
+            <a:normAutofit/>
+          </a:bodyPr>
+          <a:lstStyle/>
+          <a:p>
+            <a:r>
+              <a:rPr lang="en-US" sz="3600" b="1" dirty="0"/>
+              <a:t>It has been claimed that the spread of the disease is slowed down as the temperature rises, is this true?</a:t>
+            </a:r>
+          </a:p>
+        </p:txBody>
+      </p:sp>
+      <p:pic>
+        <p:nvPicPr>
+          <p:cNvPr id="5" name="Picture 4">
+            <a:extLst>
+              <a:ext uri="{FF2B5EF4-FFF2-40B4-BE49-F238E27FC236}">
+                <a16:creationId xmlns:a16="http://schemas.microsoft.com/office/drawing/2014/main" id="{2E48ADB1-7DC7-7642-B8F1-89EC2B3904A5}"/>
+              </a:ext>
+            </a:extLst>
+          </p:cNvPr>
+          <p:cNvPicPr>
+            <a:picLocks noChangeAspect="1"/>
+          </p:cNvPicPr>
+          <p:nvPr/>
+        </p:nvPicPr>
+        <p:blipFill>
+          <a:blip r:embed="rId2"/>
+          <a:srcRect/>
+          <a:stretch/>
+        </p:blipFill>
+        <p:spPr>
+          <a:xfrm>
+            <a:off x="429768" y="1747238"/>
+            <a:ext cx="6704890" cy="4469926"/>
+          </a:xfrm>
+          <a:prstGeom prst="rect">
+            <a:avLst/>
+          </a:prstGeom>
+        </p:spPr>
+      </p:pic>
+      <p:sp>
+        <p:nvSpPr>
+          <p:cNvPr id="7" name="Content Placeholder 6">
+            <a:extLst>
+              <a:ext uri="{FF2B5EF4-FFF2-40B4-BE49-F238E27FC236}">
+                <a16:creationId xmlns:a16="http://schemas.microsoft.com/office/drawing/2014/main" id="{27BAADB3-00A2-0144-9CAC-FA699A89F9E5}"/>
+              </a:ext>
+            </a:extLst>
+          </p:cNvPr>
+          <p:cNvSpPr>
+            <a:spLocks noGrp="1"/>
+          </p:cNvSpPr>
+          <p:nvPr>
+            <p:ph idx="1"/>
+          </p:nvPr>
+        </p:nvSpPr>
+        <p:spPr>
+          <a:xfrm>
+            <a:off x="7271656" y="1629992"/>
+            <a:ext cx="3946289" cy="4587173"/>
+          </a:xfrm>
+        </p:spPr>
+        <p:txBody>
+          <a:bodyPr vert="horz" lIns="91440" tIns="45720" rIns="91440" bIns="45720" rtlCol="0" anchor="ctr">
+            <a:normAutofit/>
+          </a:bodyPr>
+          <a:lstStyle/>
           <a:p>
             <a:pPr marL="285750"/>
+            <a:endParaRPr lang="en-US" sz="1800" dirty="0"/>
+          </a:p>
+          <a:p>
+            <a:pPr marL="285750"/>
             <a:r>
               <a:rPr lang="en-US" sz="1800" dirty="0"/>
-              <a:t>However, the </a:t>
-            </a:r>
-            <a:r>
-              <a:rPr lang="en-US" sz="1800" dirty="0" err="1"/>
-              <a:t>Openweatherapi</a:t>
-            </a:r>
+              <a:t>This scatterplot shows the average daily temperature vs daily change in active cases for Tampa, FL. (datapoints where daily change = 0 has been removed)</a:t>
+            </a:r>
+          </a:p>
+          <a:p>
+            <a:pPr marL="285750"/>
             <a:r>
               <a:rPr lang="en-US" sz="1800" dirty="0"/>
-              <a:t> does not provide historical temperature data to free users, so the dataset probably does not provide enough significance</a:t>
-            </a:r>
-          </a:p>
+              <a:t>Linear regression analysis for this country shows a very very slight negative correlation between temperature and daily change in the number of active cases.</a:t>
+            </a:r>
+          </a:p>
+          <a:p>
+            <a:pPr marL="57150" indent="0">
+              <a:buNone/>
+            </a:pPr>
+            <a:endParaRPr lang="en-US" sz="1800" dirty="0"/>
+          </a:p>
+        </p:txBody>
+      </p:sp>
+    </p:spTree>
+    <p:extLst>
+      <p:ext uri="{BB962C8B-B14F-4D97-AF65-F5344CB8AC3E}">
+        <p14:creationId xmlns:p14="http://schemas.microsoft.com/office/powerpoint/2010/main" val="419938488"/>
+      </p:ext>
+    </p:extLst>
+  </p:cSld>
+  <p:clrMapOvr>
+    <a:masterClrMapping/>
+  </p:clrMapOvr>
+</p:sld>
+</file>
+
+<file path=ppt/slides/slide13.xml><?xml version="1.0" encoding="utf-8"?>
+<p:sld xmlns:a="http://schemas.openxmlformats.org/drawingml/2006/main" xmlns:r="http://schemas.openxmlformats.org/officeDocument/2006/relationships" xmlns:p="http://schemas.openxmlformats.org/presentationml/2006/main">
+  <p:cSld>
+    <p:spTree>
+      <p:nvGrpSpPr>
+        <p:cNvPr id="1" name=""/>
+        <p:cNvGrpSpPr/>
+        <p:nvPr/>
+      </p:nvGrpSpPr>
+      <p:grpSpPr>
+        <a:xfrm>
+          <a:off x="0" y="0"/>
+          <a:ext cx="0" cy="0"/>
+          <a:chOff x="0" y="0"/>
+          <a:chExt cx="0" cy="0"/>
+        </a:xfrm>
+      </p:grpSpPr>
+      <p:sp>
+        <p:nvSpPr>
+          <p:cNvPr id="2" name="Title 1">
+            <a:extLst>
+              <a:ext uri="{FF2B5EF4-FFF2-40B4-BE49-F238E27FC236}">
+                <a16:creationId xmlns:a16="http://schemas.microsoft.com/office/drawing/2014/main" id="{6C86CADF-F0CD-DC42-8789-D52C508FF3A7}"/>
+              </a:ext>
+            </a:extLst>
+          </p:cNvPr>
+          <p:cNvSpPr>
+            <a:spLocks noGrp="1"/>
+          </p:cNvSpPr>
+          <p:nvPr>
+            <p:ph type="title"/>
+          </p:nvPr>
+        </p:nvSpPr>
+        <p:spPr>
+          <a:xfrm>
+            <a:off x="429768" y="411480"/>
+            <a:ext cx="11201400" cy="1106424"/>
+          </a:xfrm>
+        </p:spPr>
+        <p:txBody>
+          <a:bodyPr vert="horz" lIns="91440" tIns="45720" rIns="91440" bIns="45720" rtlCol="0">
+            <a:normAutofit/>
+          </a:bodyPr>
+          <a:lstStyle/>
+          <a:p>
+            <a:r>
+              <a:rPr lang="en-US" sz="3600" b="1" dirty="0"/>
+              <a:t>It has been claimed that the spread of the disease is slowed down as the temperature rises, is this true?</a:t>
+            </a:r>
+          </a:p>
+        </p:txBody>
+      </p:sp>
+      <p:pic>
+        <p:nvPicPr>
+          <p:cNvPr id="5" name="Picture 4">
+            <a:extLst>
+              <a:ext uri="{FF2B5EF4-FFF2-40B4-BE49-F238E27FC236}">
+                <a16:creationId xmlns:a16="http://schemas.microsoft.com/office/drawing/2014/main" id="{2E48ADB1-7DC7-7642-B8F1-89EC2B3904A5}"/>
+              </a:ext>
+            </a:extLst>
+          </p:cNvPr>
+          <p:cNvPicPr>
+            <a:picLocks noChangeAspect="1"/>
+          </p:cNvPicPr>
+          <p:nvPr/>
+        </p:nvPicPr>
+        <p:blipFill>
+          <a:blip r:embed="rId2"/>
+          <a:srcRect/>
+          <a:stretch/>
+        </p:blipFill>
+        <p:spPr>
+          <a:xfrm>
+            <a:off x="429768" y="1747238"/>
+            <a:ext cx="6704890" cy="4469927"/>
+          </a:xfrm>
+          <a:prstGeom prst="rect">
+            <a:avLst/>
+          </a:prstGeom>
+        </p:spPr>
+      </p:pic>
+      <p:sp>
+        <p:nvSpPr>
+          <p:cNvPr id="7" name="Content Placeholder 6">
+            <a:extLst>
+              <a:ext uri="{FF2B5EF4-FFF2-40B4-BE49-F238E27FC236}">
+                <a16:creationId xmlns:a16="http://schemas.microsoft.com/office/drawing/2014/main" id="{27BAADB3-00A2-0144-9CAC-FA699A89F9E5}"/>
+              </a:ext>
+            </a:extLst>
+          </p:cNvPr>
+          <p:cNvSpPr>
+            <a:spLocks noGrp="1"/>
+          </p:cNvSpPr>
+          <p:nvPr>
+            <p:ph idx="1"/>
+          </p:nvPr>
+        </p:nvSpPr>
+        <p:spPr>
+          <a:xfrm>
+            <a:off x="7271656" y="1629992"/>
+            <a:ext cx="3946289" cy="4587173"/>
+          </a:xfrm>
+        </p:spPr>
+        <p:txBody>
+          <a:bodyPr vert="horz" lIns="91440" tIns="45720" rIns="91440" bIns="45720" rtlCol="0" anchor="ctr">
+            <a:normAutofit/>
+          </a:bodyPr>
+          <a:lstStyle/>
           <a:p>
             <a:pPr marL="285750"/>
-            <a:r>
-              <a:rPr lang="en-US" sz="1800" b="1" u="sng" dirty="0"/>
-              <a:t>Conclusion</a:t>
-            </a:r>
-            <a:r>
-              <a:rPr lang="en-US" sz="1800" b="1" dirty="0"/>
-              <a:t>: </a:t>
-            </a:r>
+            <a:endParaRPr lang="en-US" sz="1800" dirty="0"/>
+          </a:p>
+          <a:p>
+            <a:pPr marL="285750"/>
             <a:r>
               <a:rPr lang="en-US" sz="1800" dirty="0"/>
-              <a:t>It may be true, we would have to look at more data, read into the pricing document for </a:t>
-            </a:r>
-            <a:r>
-              <a:rPr lang="en-US" sz="1800" dirty="0" err="1"/>
-              <a:t>api</a:t>
-            </a:r>
+              <a:t>This scatterplot shows the average daily temperature vs daily change in active cases for Seoul, Korea. (datapoints where daily change = 0 has been removed)</a:t>
+            </a:r>
+          </a:p>
+          <a:p>
+            <a:pPr marL="285750"/>
             <a:r>
               <a:rPr lang="en-US" sz="1800" dirty="0"/>
-              <a:t> requests more carefully before you start your project.</a:t>
+              <a:t>Linear regression analysis for this country shows a very very slight negative correlation between temperature and daily change in the number of active cases.</a:t>
             </a:r>
           </a:p>
           <a:p>
@@ -3979,6 +4238,191 @@
     <p:extLst>
       <p:ext uri="{BB962C8B-B14F-4D97-AF65-F5344CB8AC3E}">
         <p14:creationId xmlns:p14="http://schemas.microsoft.com/office/powerpoint/2010/main" val="2623499795"/>
+      </p:ext>
+    </p:extLst>
+  </p:cSld>
+  <p:clrMapOvr>
+    <a:masterClrMapping/>
+  </p:clrMapOvr>
+</p:sld>
+</file>
+
+<file path=ppt/slides/slide14.xml><?xml version="1.0" encoding="utf-8"?>
+<p:sld xmlns:a="http://schemas.openxmlformats.org/drawingml/2006/main" xmlns:r="http://schemas.openxmlformats.org/officeDocument/2006/relationships" xmlns:p="http://schemas.openxmlformats.org/presentationml/2006/main">
+  <p:cSld>
+    <p:spTree>
+      <p:nvGrpSpPr>
+        <p:cNvPr id="1" name=""/>
+        <p:cNvGrpSpPr/>
+        <p:nvPr/>
+      </p:nvGrpSpPr>
+      <p:grpSpPr>
+        <a:xfrm>
+          <a:off x="0" y="0"/>
+          <a:ext cx="0" cy="0"/>
+          <a:chOff x="0" y="0"/>
+          <a:chExt cx="0" cy="0"/>
+        </a:xfrm>
+      </p:grpSpPr>
+      <p:sp>
+        <p:nvSpPr>
+          <p:cNvPr id="2" name="Title 1">
+            <a:extLst>
+              <a:ext uri="{FF2B5EF4-FFF2-40B4-BE49-F238E27FC236}">
+                <a16:creationId xmlns:a16="http://schemas.microsoft.com/office/drawing/2014/main" id="{6C86CADF-F0CD-DC42-8789-D52C508FF3A7}"/>
+              </a:ext>
+            </a:extLst>
+          </p:cNvPr>
+          <p:cNvSpPr>
+            <a:spLocks noGrp="1"/>
+          </p:cNvSpPr>
+          <p:nvPr>
+            <p:ph type="title"/>
+          </p:nvPr>
+        </p:nvSpPr>
+        <p:spPr>
+          <a:xfrm>
+            <a:off x="429768" y="411480"/>
+            <a:ext cx="11201400" cy="1106424"/>
+          </a:xfrm>
+        </p:spPr>
+        <p:txBody>
+          <a:bodyPr vert="horz" lIns="91440" tIns="45720" rIns="91440" bIns="45720" rtlCol="0">
+            <a:normAutofit/>
+          </a:bodyPr>
+          <a:lstStyle/>
+          <a:p>
+            <a:r>
+              <a:rPr lang="en-US" sz="3600" b="1" dirty="0"/>
+              <a:t>It has been claimed that the spread of the disease is slowed down as the temperature rises, is this true?</a:t>
+            </a:r>
+          </a:p>
+        </p:txBody>
+      </p:sp>
+      <p:pic>
+        <p:nvPicPr>
+          <p:cNvPr id="5" name="Picture 4">
+            <a:extLst>
+              <a:ext uri="{FF2B5EF4-FFF2-40B4-BE49-F238E27FC236}">
+                <a16:creationId xmlns:a16="http://schemas.microsoft.com/office/drawing/2014/main" id="{2E48ADB1-7DC7-7642-B8F1-89EC2B3904A5}"/>
+              </a:ext>
+            </a:extLst>
+          </p:cNvPr>
+          <p:cNvPicPr>
+            <a:picLocks noChangeAspect="1"/>
+          </p:cNvPicPr>
+          <p:nvPr/>
+        </p:nvPicPr>
+        <p:blipFill>
+          <a:blip r:embed="rId2"/>
+          <a:srcRect/>
+          <a:stretch/>
+        </p:blipFill>
+        <p:spPr>
+          <a:xfrm>
+            <a:off x="429768" y="1747238"/>
+            <a:ext cx="6704889" cy="4469926"/>
+          </a:xfrm>
+          <a:prstGeom prst="rect">
+            <a:avLst/>
+          </a:prstGeom>
+        </p:spPr>
+      </p:pic>
+      <p:sp>
+        <p:nvSpPr>
+          <p:cNvPr id="7" name="Content Placeholder 6">
+            <a:extLst>
+              <a:ext uri="{FF2B5EF4-FFF2-40B4-BE49-F238E27FC236}">
+                <a16:creationId xmlns:a16="http://schemas.microsoft.com/office/drawing/2014/main" id="{27BAADB3-00A2-0144-9CAC-FA699A89F9E5}"/>
+              </a:ext>
+            </a:extLst>
+          </p:cNvPr>
+          <p:cNvSpPr>
+            <a:spLocks noGrp="1"/>
+          </p:cNvSpPr>
+          <p:nvPr>
+            <p:ph idx="1"/>
+          </p:nvPr>
+        </p:nvSpPr>
+        <p:spPr>
+          <a:xfrm>
+            <a:off x="6770914" y="1629992"/>
+            <a:ext cx="4860254" cy="4587173"/>
+          </a:xfrm>
+        </p:spPr>
+        <p:txBody>
+          <a:bodyPr vert="horz" lIns="91440" tIns="45720" rIns="91440" bIns="45720" rtlCol="0" anchor="ctr">
+            <a:normAutofit lnSpcReduction="10000"/>
+          </a:bodyPr>
+          <a:lstStyle/>
+          <a:p>
+            <a:pPr marL="285750"/>
+            <a:endParaRPr lang="en-US" sz="1800" dirty="0"/>
+          </a:p>
+          <a:p>
+            <a:pPr marL="285750"/>
+            <a:r>
+              <a:rPr lang="en-US" sz="1800" dirty="0"/>
+              <a:t>This scatterplot shows the average daily temperature vs daily change in active cases for the three aforementioned locations. (datapoints where daily change = 0 has been removed)</a:t>
+            </a:r>
+          </a:p>
+          <a:p>
+            <a:pPr marL="285750"/>
+            <a:r>
+              <a:rPr lang="en-US" sz="1800" dirty="0"/>
+              <a:t>Linear regression analysis for this country shows a very very slight negative correlation between temperature and daily change in the number of active cases.</a:t>
+            </a:r>
+          </a:p>
+          <a:p>
+            <a:pPr marL="285750"/>
+            <a:r>
+              <a:rPr lang="en-US" sz="1800" dirty="0"/>
+              <a:t>However, it’s important to note that the </a:t>
+            </a:r>
+            <a:r>
+              <a:rPr lang="en-US" sz="1800" dirty="0" err="1"/>
+              <a:t>Openweatherapi</a:t>
+            </a:r>
+            <a:r>
+              <a:rPr lang="en-US" sz="1800" dirty="0"/>
+              <a:t> does not provide historical temperature data to free users, so the dataset probably does not provide enough significance</a:t>
+            </a:r>
+          </a:p>
+          <a:p>
+            <a:pPr marL="285750"/>
+            <a:r>
+              <a:rPr lang="en-US" sz="1800" b="1" u="sng" dirty="0"/>
+              <a:t>Conclusion</a:t>
+            </a:r>
+            <a:r>
+              <a:rPr lang="en-US" sz="1800" b="1" dirty="0"/>
+              <a:t>: </a:t>
+            </a:r>
+            <a:r>
+              <a:rPr lang="en-US" sz="1800" dirty="0"/>
+              <a:t>It may be true, we would have to look at more data, read into the pricing document for </a:t>
+            </a:r>
+            <a:r>
+              <a:rPr lang="en-US" sz="1800" dirty="0" err="1"/>
+              <a:t>api</a:t>
+            </a:r>
+            <a:r>
+              <a:rPr lang="en-US" sz="1800" dirty="0"/>
+              <a:t> requests more carefully before you start your project.</a:t>
+            </a:r>
+          </a:p>
+          <a:p>
+            <a:pPr marL="57150" indent="0">
+              <a:buNone/>
+            </a:pPr>
+            <a:endParaRPr lang="en-US" sz="1800" dirty="0"/>
+          </a:p>
+        </p:txBody>
+      </p:sp>
+    </p:spTree>
+    <p:extLst>
+      <p:ext uri="{BB962C8B-B14F-4D97-AF65-F5344CB8AC3E}">
+        <p14:creationId xmlns:p14="http://schemas.microsoft.com/office/powerpoint/2010/main" val="226695164"/>
       </p:ext>
     </p:extLst>
   </p:cSld>

</xml_diff>

<commit_message>
added even more cities n=12
</commit_message>
<xml_diff>
--- a/Covid Project Final.pptx
+++ b/Covid Project Final.pptx
@@ -17,8 +17,17 @@
     <p:sldId id="266" r:id="rId11"/>
     <p:sldId id="269" r:id="rId12"/>
     <p:sldId id="270" r:id="rId13"/>
-    <p:sldId id="268" r:id="rId14"/>
-    <p:sldId id="271" r:id="rId15"/>
+    <p:sldId id="272" r:id="rId14"/>
+    <p:sldId id="273" r:id="rId15"/>
+    <p:sldId id="275" r:id="rId16"/>
+    <p:sldId id="274" r:id="rId17"/>
+    <p:sldId id="276" r:id="rId18"/>
+    <p:sldId id="279" r:id="rId19"/>
+    <p:sldId id="277" r:id="rId20"/>
+    <p:sldId id="268" r:id="rId21"/>
+    <p:sldId id="278" r:id="rId22"/>
+    <p:sldId id="280" r:id="rId23"/>
+    <p:sldId id="271" r:id="rId24"/>
   </p:sldIdLst>
   <p:sldSz cx="12192000" cy="6858000"/>
   <p:notesSz cx="6858000" cy="9144000"/>
@@ -3929,7 +3938,7 @@
             <a:pPr marL="285750"/>
             <a:r>
               <a:rPr lang="en-US" sz="1800" dirty="0"/>
-              <a:t>Linear regression analysis for this country shows a very very slight negative correlation between temperature and daily change in the number of active cases.</a:t>
+              <a:t>Linear regression analysis for this country shows a slight negative correlation between temperature and daily change in the number of active cases.</a:t>
             </a:r>
           </a:p>
           <a:p>
@@ -4174,7 +4183,7 @@
         <p:spPr>
           <a:xfrm>
             <a:off x="429768" y="1747238"/>
-            <a:ext cx="6704890" cy="4469927"/>
+            <a:ext cx="6704889" cy="4469926"/>
           </a:xfrm>
           <a:prstGeom prst="rect">
             <a:avLst/>
@@ -4216,14 +4225,14 @@
             <a:pPr marL="285750"/>
             <a:r>
               <a:rPr lang="en-US" sz="1800" dirty="0"/>
-              <a:t>This scatterplot shows the average daily temperature vs daily change in active cases for Seoul, Korea. (datapoints where daily change = 0 has been removed)</a:t>
+              <a:t>This scatterplot shows the average daily temperature vs daily change in active cases for New York, NY. (datapoints where daily change = 0 has been removed)</a:t>
             </a:r>
           </a:p>
           <a:p>
             <a:pPr marL="285750"/>
             <a:r>
               <a:rPr lang="en-US" sz="1800" dirty="0"/>
-              <a:t>Linear regression analysis for this country shows a very very slight negative correlation between temperature and daily change in the number of active cases.</a:t>
+              <a:t>Linear regression analysis for this country shows a slight negative correlation between temperature and daily change in the number of active cases.</a:t>
             </a:r>
           </a:p>
           <a:p>
@@ -4237,7 +4246,7 @@
     </p:spTree>
     <p:extLst>
       <p:ext uri="{BB962C8B-B14F-4D97-AF65-F5344CB8AC3E}">
-        <p14:creationId xmlns:p14="http://schemas.microsoft.com/office/powerpoint/2010/main" val="2623499795"/>
+        <p14:creationId xmlns:p14="http://schemas.microsoft.com/office/powerpoint/2010/main" val="4186751246"/>
       </p:ext>
     </p:extLst>
   </p:cSld>
@@ -4346,13 +4355,13 @@
         </p:nvSpPr>
         <p:spPr>
           <a:xfrm>
-            <a:off x="6770914" y="1629992"/>
-            <a:ext cx="4860254" cy="4587173"/>
+            <a:off x="7271656" y="1629992"/>
+            <a:ext cx="3946289" cy="4587173"/>
           </a:xfrm>
         </p:spPr>
         <p:txBody>
           <a:bodyPr vert="horz" lIns="91440" tIns="45720" rIns="91440" bIns="45720" rtlCol="0" anchor="ctr">
-            <a:normAutofit lnSpcReduction="10000"/>
+            <a:normAutofit/>
           </a:bodyPr>
           <a:lstStyle/>
           <a:p>
@@ -4363,52 +4372,14 @@
             <a:pPr marL="285750"/>
             <a:r>
               <a:rPr lang="en-US" sz="1800" dirty="0"/>
-              <a:t>This scatterplot shows the average daily temperature vs daily change in active cases for the three aforementioned locations. (datapoints where daily change = 0 has been removed)</a:t>
+              <a:t>This scatterplot shows the average daily temperature vs daily change in active cases for Detroit, MI. (datapoints where daily change = 0 has been removed)</a:t>
             </a:r>
           </a:p>
           <a:p>
             <a:pPr marL="285750"/>
             <a:r>
               <a:rPr lang="en-US" sz="1800" dirty="0"/>
-              <a:t>Linear regression analysis for this country shows a very very slight negative correlation between temperature and daily change in the number of active cases.</a:t>
-            </a:r>
-          </a:p>
-          <a:p>
-            <a:pPr marL="285750"/>
-            <a:r>
-              <a:rPr lang="en-US" sz="1800" dirty="0"/>
-              <a:t>However, it’s important to note that the </a:t>
-            </a:r>
-            <a:r>
-              <a:rPr lang="en-US" sz="1800" dirty="0" err="1"/>
-              <a:t>Openweatherapi</a:t>
-            </a:r>
-            <a:r>
-              <a:rPr lang="en-US" sz="1800" dirty="0"/>
-              <a:t> does not provide historical temperature data to free users, so the dataset probably does not provide enough significance</a:t>
-            </a:r>
-          </a:p>
-          <a:p>
-            <a:pPr marL="285750"/>
-            <a:r>
-              <a:rPr lang="en-US" sz="1800" b="1" u="sng" dirty="0"/>
-              <a:t>Conclusion</a:t>
-            </a:r>
-            <a:r>
-              <a:rPr lang="en-US" sz="1800" b="1" dirty="0"/>
-              <a:t>: </a:t>
-            </a:r>
-            <a:r>
-              <a:rPr lang="en-US" sz="1800" dirty="0"/>
-              <a:t>It may be true, we would have to look at more data, read into the pricing document for </a:t>
-            </a:r>
-            <a:r>
-              <a:rPr lang="en-US" sz="1800" dirty="0" err="1"/>
-              <a:t>api</a:t>
-            </a:r>
-            <a:r>
-              <a:rPr lang="en-US" sz="1800" dirty="0"/>
-              <a:t> requests more carefully before you start your project.</a:t>
+              <a:t>Linear regression analysis for this country shows a slight negative correlation between temperature and daily change in the number of active cases.</a:t>
             </a:r>
           </a:p>
           <a:p>
@@ -4422,7 +4393,742 @@
     </p:spTree>
     <p:extLst>
       <p:ext uri="{BB962C8B-B14F-4D97-AF65-F5344CB8AC3E}">
-        <p14:creationId xmlns:p14="http://schemas.microsoft.com/office/powerpoint/2010/main" val="226695164"/>
+        <p14:creationId xmlns:p14="http://schemas.microsoft.com/office/powerpoint/2010/main" val="2900887865"/>
+      </p:ext>
+    </p:extLst>
+  </p:cSld>
+  <p:clrMapOvr>
+    <a:masterClrMapping/>
+  </p:clrMapOvr>
+</p:sld>
+</file>
+
+<file path=ppt/slides/slide15.xml><?xml version="1.0" encoding="utf-8"?>
+<p:sld xmlns:a="http://schemas.openxmlformats.org/drawingml/2006/main" xmlns:r="http://schemas.openxmlformats.org/officeDocument/2006/relationships" xmlns:p="http://schemas.openxmlformats.org/presentationml/2006/main">
+  <p:cSld>
+    <p:spTree>
+      <p:nvGrpSpPr>
+        <p:cNvPr id="1" name=""/>
+        <p:cNvGrpSpPr/>
+        <p:nvPr/>
+      </p:nvGrpSpPr>
+      <p:grpSpPr>
+        <a:xfrm>
+          <a:off x="0" y="0"/>
+          <a:ext cx="0" cy="0"/>
+          <a:chOff x="0" y="0"/>
+          <a:chExt cx="0" cy="0"/>
+        </a:xfrm>
+      </p:grpSpPr>
+      <p:sp>
+        <p:nvSpPr>
+          <p:cNvPr id="2" name="Title 1">
+            <a:extLst>
+              <a:ext uri="{FF2B5EF4-FFF2-40B4-BE49-F238E27FC236}">
+                <a16:creationId xmlns:a16="http://schemas.microsoft.com/office/drawing/2014/main" id="{6C86CADF-F0CD-DC42-8789-D52C508FF3A7}"/>
+              </a:ext>
+            </a:extLst>
+          </p:cNvPr>
+          <p:cNvSpPr>
+            <a:spLocks noGrp="1"/>
+          </p:cNvSpPr>
+          <p:nvPr>
+            <p:ph type="title"/>
+          </p:nvPr>
+        </p:nvSpPr>
+        <p:spPr>
+          <a:xfrm>
+            <a:off x="429768" y="411480"/>
+            <a:ext cx="11201400" cy="1106424"/>
+          </a:xfrm>
+        </p:spPr>
+        <p:txBody>
+          <a:bodyPr vert="horz" lIns="91440" tIns="45720" rIns="91440" bIns="45720" rtlCol="0">
+            <a:normAutofit/>
+          </a:bodyPr>
+          <a:lstStyle/>
+          <a:p>
+            <a:r>
+              <a:rPr lang="en-US" sz="3600" b="1" dirty="0"/>
+              <a:t>It has been claimed that the spread of the disease is slowed down as the temperature rises, is this true?</a:t>
+            </a:r>
+          </a:p>
+        </p:txBody>
+      </p:sp>
+      <p:pic>
+        <p:nvPicPr>
+          <p:cNvPr id="5" name="Picture 4">
+            <a:extLst>
+              <a:ext uri="{FF2B5EF4-FFF2-40B4-BE49-F238E27FC236}">
+                <a16:creationId xmlns:a16="http://schemas.microsoft.com/office/drawing/2014/main" id="{2E48ADB1-7DC7-7642-B8F1-89EC2B3904A5}"/>
+              </a:ext>
+            </a:extLst>
+          </p:cNvPr>
+          <p:cNvPicPr>
+            <a:picLocks noChangeAspect="1"/>
+          </p:cNvPicPr>
+          <p:nvPr/>
+        </p:nvPicPr>
+        <p:blipFill>
+          <a:blip r:embed="rId2"/>
+          <a:srcRect/>
+          <a:stretch/>
+        </p:blipFill>
+        <p:spPr>
+          <a:xfrm>
+            <a:off x="429768" y="1747238"/>
+            <a:ext cx="6704889" cy="4469926"/>
+          </a:xfrm>
+          <a:prstGeom prst="rect">
+            <a:avLst/>
+          </a:prstGeom>
+        </p:spPr>
+      </p:pic>
+      <p:sp>
+        <p:nvSpPr>
+          <p:cNvPr id="7" name="Content Placeholder 6">
+            <a:extLst>
+              <a:ext uri="{FF2B5EF4-FFF2-40B4-BE49-F238E27FC236}">
+                <a16:creationId xmlns:a16="http://schemas.microsoft.com/office/drawing/2014/main" id="{27BAADB3-00A2-0144-9CAC-FA699A89F9E5}"/>
+              </a:ext>
+            </a:extLst>
+          </p:cNvPr>
+          <p:cNvSpPr>
+            <a:spLocks noGrp="1"/>
+          </p:cNvSpPr>
+          <p:nvPr>
+            <p:ph idx="1"/>
+          </p:nvPr>
+        </p:nvSpPr>
+        <p:spPr>
+          <a:xfrm>
+            <a:off x="7271656" y="1629992"/>
+            <a:ext cx="3946289" cy="4587173"/>
+          </a:xfrm>
+        </p:spPr>
+        <p:txBody>
+          <a:bodyPr vert="horz" lIns="91440" tIns="45720" rIns="91440" bIns="45720" rtlCol="0" anchor="ctr">
+            <a:normAutofit/>
+          </a:bodyPr>
+          <a:lstStyle/>
+          <a:p>
+            <a:pPr marL="285750"/>
+            <a:endParaRPr lang="en-US" sz="1800" dirty="0"/>
+          </a:p>
+          <a:p>
+            <a:pPr marL="285750"/>
+            <a:r>
+              <a:rPr lang="en-US" sz="1800" dirty="0"/>
+              <a:t>This scatterplot shows the average daily temperature vs daily change in active cases for Toronto, ON. (datapoints where daily change = 0 has been removed)</a:t>
+            </a:r>
+          </a:p>
+          <a:p>
+            <a:pPr marL="285750"/>
+            <a:r>
+              <a:rPr lang="en-US" sz="1800" dirty="0"/>
+              <a:t>Linear regression analysis for this country shows a slight negative correlation between temperature and daily change in the number of active cases.</a:t>
+            </a:r>
+          </a:p>
+          <a:p>
+            <a:pPr marL="57150" indent="0">
+              <a:buNone/>
+            </a:pPr>
+            <a:endParaRPr lang="en-US" sz="1800" dirty="0"/>
+          </a:p>
+        </p:txBody>
+      </p:sp>
+    </p:spTree>
+    <p:extLst>
+      <p:ext uri="{BB962C8B-B14F-4D97-AF65-F5344CB8AC3E}">
+        <p14:creationId xmlns:p14="http://schemas.microsoft.com/office/powerpoint/2010/main" val="4223533568"/>
+      </p:ext>
+    </p:extLst>
+  </p:cSld>
+  <p:clrMapOvr>
+    <a:masterClrMapping/>
+  </p:clrMapOvr>
+</p:sld>
+</file>
+
+<file path=ppt/slides/slide16.xml><?xml version="1.0" encoding="utf-8"?>
+<p:sld xmlns:a="http://schemas.openxmlformats.org/drawingml/2006/main" xmlns:r="http://schemas.openxmlformats.org/officeDocument/2006/relationships" xmlns:p="http://schemas.openxmlformats.org/presentationml/2006/main">
+  <p:cSld>
+    <p:spTree>
+      <p:nvGrpSpPr>
+        <p:cNvPr id="1" name=""/>
+        <p:cNvGrpSpPr/>
+        <p:nvPr/>
+      </p:nvGrpSpPr>
+      <p:grpSpPr>
+        <a:xfrm>
+          <a:off x="0" y="0"/>
+          <a:ext cx="0" cy="0"/>
+          <a:chOff x="0" y="0"/>
+          <a:chExt cx="0" cy="0"/>
+        </a:xfrm>
+      </p:grpSpPr>
+      <p:sp>
+        <p:nvSpPr>
+          <p:cNvPr id="2" name="Title 1">
+            <a:extLst>
+              <a:ext uri="{FF2B5EF4-FFF2-40B4-BE49-F238E27FC236}">
+                <a16:creationId xmlns:a16="http://schemas.microsoft.com/office/drawing/2014/main" id="{6C86CADF-F0CD-DC42-8789-D52C508FF3A7}"/>
+              </a:ext>
+            </a:extLst>
+          </p:cNvPr>
+          <p:cNvSpPr>
+            <a:spLocks noGrp="1"/>
+          </p:cNvSpPr>
+          <p:nvPr>
+            <p:ph type="title"/>
+          </p:nvPr>
+        </p:nvSpPr>
+        <p:spPr>
+          <a:xfrm>
+            <a:off x="429768" y="411480"/>
+            <a:ext cx="11201400" cy="1106424"/>
+          </a:xfrm>
+        </p:spPr>
+        <p:txBody>
+          <a:bodyPr vert="horz" lIns="91440" tIns="45720" rIns="91440" bIns="45720" rtlCol="0">
+            <a:normAutofit/>
+          </a:bodyPr>
+          <a:lstStyle/>
+          <a:p>
+            <a:r>
+              <a:rPr lang="en-US" sz="3600" b="1" dirty="0"/>
+              <a:t>It has been claimed that the spread of the disease is slowed down as the temperature rises, is this true?</a:t>
+            </a:r>
+          </a:p>
+        </p:txBody>
+      </p:sp>
+      <p:pic>
+        <p:nvPicPr>
+          <p:cNvPr id="5" name="Picture 4">
+            <a:extLst>
+              <a:ext uri="{FF2B5EF4-FFF2-40B4-BE49-F238E27FC236}">
+                <a16:creationId xmlns:a16="http://schemas.microsoft.com/office/drawing/2014/main" id="{2E48ADB1-7DC7-7642-B8F1-89EC2B3904A5}"/>
+              </a:ext>
+            </a:extLst>
+          </p:cNvPr>
+          <p:cNvPicPr>
+            <a:picLocks noChangeAspect="1"/>
+          </p:cNvPicPr>
+          <p:nvPr/>
+        </p:nvPicPr>
+        <p:blipFill>
+          <a:blip r:embed="rId2"/>
+          <a:srcRect/>
+          <a:stretch/>
+        </p:blipFill>
+        <p:spPr>
+          <a:xfrm>
+            <a:off x="429768" y="1747238"/>
+            <a:ext cx="6704889" cy="4469926"/>
+          </a:xfrm>
+          <a:prstGeom prst="rect">
+            <a:avLst/>
+          </a:prstGeom>
+        </p:spPr>
+      </p:pic>
+      <p:sp>
+        <p:nvSpPr>
+          <p:cNvPr id="7" name="Content Placeholder 6">
+            <a:extLst>
+              <a:ext uri="{FF2B5EF4-FFF2-40B4-BE49-F238E27FC236}">
+                <a16:creationId xmlns:a16="http://schemas.microsoft.com/office/drawing/2014/main" id="{27BAADB3-00A2-0144-9CAC-FA699A89F9E5}"/>
+              </a:ext>
+            </a:extLst>
+          </p:cNvPr>
+          <p:cNvSpPr>
+            <a:spLocks noGrp="1"/>
+          </p:cNvSpPr>
+          <p:nvPr>
+            <p:ph idx="1"/>
+          </p:nvPr>
+        </p:nvSpPr>
+        <p:spPr>
+          <a:xfrm>
+            <a:off x="7271656" y="1629992"/>
+            <a:ext cx="3946289" cy="4587173"/>
+          </a:xfrm>
+        </p:spPr>
+        <p:txBody>
+          <a:bodyPr vert="horz" lIns="91440" tIns="45720" rIns="91440" bIns="45720" rtlCol="0" anchor="ctr">
+            <a:normAutofit/>
+          </a:bodyPr>
+          <a:lstStyle/>
+          <a:p>
+            <a:pPr marL="285750"/>
+            <a:endParaRPr lang="en-US" sz="1800" dirty="0"/>
+          </a:p>
+          <a:p>
+            <a:pPr marL="285750"/>
+            <a:r>
+              <a:rPr lang="en-US" sz="1800" dirty="0"/>
+              <a:t>This scatterplot shows the average daily temperature vs daily change in active cases for Italy. (datapoints where daily change = 0 has been removed, temperature data was for Rome, Italy)</a:t>
+            </a:r>
+          </a:p>
+          <a:p>
+            <a:pPr marL="285750"/>
+            <a:r>
+              <a:rPr lang="en-US" sz="1800" dirty="0"/>
+              <a:t>Linear regression analysis for this country shows a very very slight negative correlation between temperature and daily change in the number of active cases.</a:t>
+            </a:r>
+          </a:p>
+          <a:p>
+            <a:pPr marL="57150" indent="0">
+              <a:buNone/>
+            </a:pPr>
+            <a:endParaRPr lang="en-US" sz="1800" dirty="0"/>
+          </a:p>
+        </p:txBody>
+      </p:sp>
+    </p:spTree>
+    <p:extLst>
+      <p:ext uri="{BB962C8B-B14F-4D97-AF65-F5344CB8AC3E}">
+        <p14:creationId xmlns:p14="http://schemas.microsoft.com/office/powerpoint/2010/main" val="124075552"/>
+      </p:ext>
+    </p:extLst>
+  </p:cSld>
+  <p:clrMapOvr>
+    <a:masterClrMapping/>
+  </p:clrMapOvr>
+</p:sld>
+</file>
+
+<file path=ppt/slides/slide17.xml><?xml version="1.0" encoding="utf-8"?>
+<p:sld xmlns:a="http://schemas.openxmlformats.org/drawingml/2006/main" xmlns:r="http://schemas.openxmlformats.org/officeDocument/2006/relationships" xmlns:p="http://schemas.openxmlformats.org/presentationml/2006/main">
+  <p:cSld>
+    <p:spTree>
+      <p:nvGrpSpPr>
+        <p:cNvPr id="1" name=""/>
+        <p:cNvGrpSpPr/>
+        <p:nvPr/>
+      </p:nvGrpSpPr>
+      <p:grpSpPr>
+        <a:xfrm>
+          <a:off x="0" y="0"/>
+          <a:ext cx="0" cy="0"/>
+          <a:chOff x="0" y="0"/>
+          <a:chExt cx="0" cy="0"/>
+        </a:xfrm>
+      </p:grpSpPr>
+      <p:sp>
+        <p:nvSpPr>
+          <p:cNvPr id="2" name="Title 1">
+            <a:extLst>
+              <a:ext uri="{FF2B5EF4-FFF2-40B4-BE49-F238E27FC236}">
+                <a16:creationId xmlns:a16="http://schemas.microsoft.com/office/drawing/2014/main" id="{6C86CADF-F0CD-DC42-8789-D52C508FF3A7}"/>
+              </a:ext>
+            </a:extLst>
+          </p:cNvPr>
+          <p:cNvSpPr>
+            <a:spLocks noGrp="1"/>
+          </p:cNvSpPr>
+          <p:nvPr>
+            <p:ph type="title"/>
+          </p:nvPr>
+        </p:nvSpPr>
+        <p:spPr>
+          <a:xfrm>
+            <a:off x="429768" y="411480"/>
+            <a:ext cx="11201400" cy="1106424"/>
+          </a:xfrm>
+        </p:spPr>
+        <p:txBody>
+          <a:bodyPr vert="horz" lIns="91440" tIns="45720" rIns="91440" bIns="45720" rtlCol="0">
+            <a:normAutofit/>
+          </a:bodyPr>
+          <a:lstStyle/>
+          <a:p>
+            <a:r>
+              <a:rPr lang="en-US" sz="3600" b="1" dirty="0"/>
+              <a:t>It has been claimed that the spread of the disease is slowed down as the temperature rises, is this true?</a:t>
+            </a:r>
+          </a:p>
+        </p:txBody>
+      </p:sp>
+      <p:pic>
+        <p:nvPicPr>
+          <p:cNvPr id="5" name="Picture 4">
+            <a:extLst>
+              <a:ext uri="{FF2B5EF4-FFF2-40B4-BE49-F238E27FC236}">
+                <a16:creationId xmlns:a16="http://schemas.microsoft.com/office/drawing/2014/main" id="{2E48ADB1-7DC7-7642-B8F1-89EC2B3904A5}"/>
+              </a:ext>
+            </a:extLst>
+          </p:cNvPr>
+          <p:cNvPicPr>
+            <a:picLocks noChangeAspect="1"/>
+          </p:cNvPicPr>
+          <p:nvPr/>
+        </p:nvPicPr>
+        <p:blipFill>
+          <a:blip r:embed="rId2"/>
+          <a:srcRect/>
+          <a:stretch/>
+        </p:blipFill>
+        <p:spPr>
+          <a:xfrm>
+            <a:off x="429768" y="1747238"/>
+            <a:ext cx="6704889" cy="4469926"/>
+          </a:xfrm>
+          <a:prstGeom prst="rect">
+            <a:avLst/>
+          </a:prstGeom>
+        </p:spPr>
+      </p:pic>
+      <p:sp>
+        <p:nvSpPr>
+          <p:cNvPr id="7" name="Content Placeholder 6">
+            <a:extLst>
+              <a:ext uri="{FF2B5EF4-FFF2-40B4-BE49-F238E27FC236}">
+                <a16:creationId xmlns:a16="http://schemas.microsoft.com/office/drawing/2014/main" id="{27BAADB3-00A2-0144-9CAC-FA699A89F9E5}"/>
+              </a:ext>
+            </a:extLst>
+          </p:cNvPr>
+          <p:cNvSpPr>
+            <a:spLocks noGrp="1"/>
+          </p:cNvSpPr>
+          <p:nvPr>
+            <p:ph idx="1"/>
+          </p:nvPr>
+        </p:nvSpPr>
+        <p:spPr>
+          <a:xfrm>
+            <a:off x="7271656" y="1629992"/>
+            <a:ext cx="3946289" cy="4587173"/>
+          </a:xfrm>
+        </p:spPr>
+        <p:txBody>
+          <a:bodyPr vert="horz" lIns="91440" tIns="45720" rIns="91440" bIns="45720" rtlCol="0" anchor="ctr">
+            <a:normAutofit/>
+          </a:bodyPr>
+          <a:lstStyle/>
+          <a:p>
+            <a:pPr marL="285750"/>
+            <a:endParaRPr lang="en-US" sz="1800" dirty="0"/>
+          </a:p>
+          <a:p>
+            <a:pPr marL="285750"/>
+            <a:r>
+              <a:rPr lang="en-US" sz="1800" dirty="0"/>
+              <a:t>This scatterplot shows the average daily temperature vs daily change in active cases for Norway. (datapoints where daily change = 0 has been removed, temperature data was for Oslo, Norway)</a:t>
+            </a:r>
+          </a:p>
+          <a:p>
+            <a:pPr marL="285750"/>
+            <a:r>
+              <a:rPr lang="en-US" sz="1800" dirty="0"/>
+              <a:t>Linear regression analysis for this country shows a negative correlation between temperature and daily change in the number of active cases.</a:t>
+            </a:r>
+          </a:p>
+          <a:p>
+            <a:pPr marL="57150" indent="0">
+              <a:buNone/>
+            </a:pPr>
+            <a:endParaRPr lang="en-US" sz="1800" dirty="0"/>
+          </a:p>
+        </p:txBody>
+      </p:sp>
+    </p:spTree>
+    <p:extLst>
+      <p:ext uri="{BB962C8B-B14F-4D97-AF65-F5344CB8AC3E}">
+        <p14:creationId xmlns:p14="http://schemas.microsoft.com/office/powerpoint/2010/main" val="2100256995"/>
+      </p:ext>
+    </p:extLst>
+  </p:cSld>
+  <p:clrMapOvr>
+    <a:masterClrMapping/>
+  </p:clrMapOvr>
+</p:sld>
+</file>
+
+<file path=ppt/slides/slide18.xml><?xml version="1.0" encoding="utf-8"?>
+<p:sld xmlns:a="http://schemas.openxmlformats.org/drawingml/2006/main" xmlns:r="http://schemas.openxmlformats.org/officeDocument/2006/relationships" xmlns:p="http://schemas.openxmlformats.org/presentationml/2006/main">
+  <p:cSld>
+    <p:spTree>
+      <p:nvGrpSpPr>
+        <p:cNvPr id="1" name=""/>
+        <p:cNvGrpSpPr/>
+        <p:nvPr/>
+      </p:nvGrpSpPr>
+      <p:grpSpPr>
+        <a:xfrm>
+          <a:off x="0" y="0"/>
+          <a:ext cx="0" cy="0"/>
+          <a:chOff x="0" y="0"/>
+          <a:chExt cx="0" cy="0"/>
+        </a:xfrm>
+      </p:grpSpPr>
+      <p:sp>
+        <p:nvSpPr>
+          <p:cNvPr id="2" name="Title 1">
+            <a:extLst>
+              <a:ext uri="{FF2B5EF4-FFF2-40B4-BE49-F238E27FC236}">
+                <a16:creationId xmlns:a16="http://schemas.microsoft.com/office/drawing/2014/main" id="{6C86CADF-F0CD-DC42-8789-D52C508FF3A7}"/>
+              </a:ext>
+            </a:extLst>
+          </p:cNvPr>
+          <p:cNvSpPr>
+            <a:spLocks noGrp="1"/>
+          </p:cNvSpPr>
+          <p:nvPr>
+            <p:ph type="title"/>
+          </p:nvPr>
+        </p:nvSpPr>
+        <p:spPr>
+          <a:xfrm>
+            <a:off x="429768" y="411480"/>
+            <a:ext cx="11201400" cy="1106424"/>
+          </a:xfrm>
+        </p:spPr>
+        <p:txBody>
+          <a:bodyPr vert="horz" lIns="91440" tIns="45720" rIns="91440" bIns="45720" rtlCol="0">
+            <a:normAutofit/>
+          </a:bodyPr>
+          <a:lstStyle/>
+          <a:p>
+            <a:r>
+              <a:rPr lang="en-US" sz="3600" b="1" dirty="0"/>
+              <a:t>It has been claimed that the spread of the disease is slowed down as the temperature rises, is this true?</a:t>
+            </a:r>
+          </a:p>
+        </p:txBody>
+      </p:sp>
+      <p:pic>
+        <p:nvPicPr>
+          <p:cNvPr id="5" name="Picture 4">
+            <a:extLst>
+              <a:ext uri="{FF2B5EF4-FFF2-40B4-BE49-F238E27FC236}">
+                <a16:creationId xmlns:a16="http://schemas.microsoft.com/office/drawing/2014/main" id="{2E48ADB1-7DC7-7642-B8F1-89EC2B3904A5}"/>
+              </a:ext>
+            </a:extLst>
+          </p:cNvPr>
+          <p:cNvPicPr>
+            <a:picLocks noChangeAspect="1"/>
+          </p:cNvPicPr>
+          <p:nvPr/>
+        </p:nvPicPr>
+        <p:blipFill>
+          <a:blip r:embed="rId2"/>
+          <a:srcRect/>
+          <a:stretch/>
+        </p:blipFill>
+        <p:spPr>
+          <a:xfrm>
+            <a:off x="429768" y="1747238"/>
+            <a:ext cx="6704889" cy="4469926"/>
+          </a:xfrm>
+          <a:prstGeom prst="rect">
+            <a:avLst/>
+          </a:prstGeom>
+        </p:spPr>
+      </p:pic>
+      <p:sp>
+        <p:nvSpPr>
+          <p:cNvPr id="7" name="Content Placeholder 6">
+            <a:extLst>
+              <a:ext uri="{FF2B5EF4-FFF2-40B4-BE49-F238E27FC236}">
+                <a16:creationId xmlns:a16="http://schemas.microsoft.com/office/drawing/2014/main" id="{27BAADB3-00A2-0144-9CAC-FA699A89F9E5}"/>
+              </a:ext>
+            </a:extLst>
+          </p:cNvPr>
+          <p:cNvSpPr>
+            <a:spLocks noGrp="1"/>
+          </p:cNvSpPr>
+          <p:nvPr>
+            <p:ph idx="1"/>
+          </p:nvPr>
+        </p:nvSpPr>
+        <p:spPr>
+          <a:xfrm>
+            <a:off x="7271656" y="1629992"/>
+            <a:ext cx="3946289" cy="4587173"/>
+          </a:xfrm>
+        </p:spPr>
+        <p:txBody>
+          <a:bodyPr vert="horz" lIns="91440" tIns="45720" rIns="91440" bIns="45720" rtlCol="0" anchor="ctr">
+            <a:normAutofit/>
+          </a:bodyPr>
+          <a:lstStyle/>
+          <a:p>
+            <a:pPr marL="285750"/>
+            <a:endParaRPr lang="en-US" sz="1800" dirty="0"/>
+          </a:p>
+          <a:p>
+            <a:pPr marL="285750"/>
+            <a:r>
+              <a:rPr lang="en-US" sz="1800" dirty="0"/>
+              <a:t>This scatterplot shows the average daily temperature vs daily change in active cases for Turkey. (datapoints where daily change = 0 has been removed, temperature data was for Istanbul, Turkey)</a:t>
+            </a:r>
+          </a:p>
+          <a:p>
+            <a:pPr marL="285750"/>
+            <a:r>
+              <a:rPr lang="en-US" sz="1800" dirty="0"/>
+              <a:t>Linear regression analysis for this country shows a very slight negative correlation between temperature and daily change in the number of active cases.</a:t>
+            </a:r>
+          </a:p>
+          <a:p>
+            <a:pPr marL="57150" indent="0">
+              <a:buNone/>
+            </a:pPr>
+            <a:endParaRPr lang="en-US" sz="1800" dirty="0"/>
+          </a:p>
+        </p:txBody>
+      </p:sp>
+    </p:spTree>
+    <p:extLst>
+      <p:ext uri="{BB962C8B-B14F-4D97-AF65-F5344CB8AC3E}">
+        <p14:creationId xmlns:p14="http://schemas.microsoft.com/office/powerpoint/2010/main" val="280537768"/>
+      </p:ext>
+    </p:extLst>
+  </p:cSld>
+  <p:clrMapOvr>
+    <a:masterClrMapping/>
+  </p:clrMapOvr>
+</p:sld>
+</file>
+
+<file path=ppt/slides/slide19.xml><?xml version="1.0" encoding="utf-8"?>
+<p:sld xmlns:a="http://schemas.openxmlformats.org/drawingml/2006/main" xmlns:r="http://schemas.openxmlformats.org/officeDocument/2006/relationships" xmlns:p="http://schemas.openxmlformats.org/presentationml/2006/main">
+  <p:cSld>
+    <p:spTree>
+      <p:nvGrpSpPr>
+        <p:cNvPr id="1" name=""/>
+        <p:cNvGrpSpPr/>
+        <p:nvPr/>
+      </p:nvGrpSpPr>
+      <p:grpSpPr>
+        <a:xfrm>
+          <a:off x="0" y="0"/>
+          <a:ext cx="0" cy="0"/>
+          <a:chOff x="0" y="0"/>
+          <a:chExt cx="0" cy="0"/>
+        </a:xfrm>
+      </p:grpSpPr>
+      <p:sp>
+        <p:nvSpPr>
+          <p:cNvPr id="2" name="Title 1">
+            <a:extLst>
+              <a:ext uri="{FF2B5EF4-FFF2-40B4-BE49-F238E27FC236}">
+                <a16:creationId xmlns:a16="http://schemas.microsoft.com/office/drawing/2014/main" id="{6C86CADF-F0CD-DC42-8789-D52C508FF3A7}"/>
+              </a:ext>
+            </a:extLst>
+          </p:cNvPr>
+          <p:cNvSpPr>
+            <a:spLocks noGrp="1"/>
+          </p:cNvSpPr>
+          <p:nvPr>
+            <p:ph type="title"/>
+          </p:nvPr>
+        </p:nvSpPr>
+        <p:spPr>
+          <a:xfrm>
+            <a:off x="429768" y="411480"/>
+            <a:ext cx="11201400" cy="1106424"/>
+          </a:xfrm>
+        </p:spPr>
+        <p:txBody>
+          <a:bodyPr vert="horz" lIns="91440" tIns="45720" rIns="91440" bIns="45720" rtlCol="0">
+            <a:normAutofit/>
+          </a:bodyPr>
+          <a:lstStyle/>
+          <a:p>
+            <a:r>
+              <a:rPr lang="en-US" sz="3600" b="1" dirty="0"/>
+              <a:t>It has been claimed that the spread of the disease is slowed down as the temperature rises, is this true?</a:t>
+            </a:r>
+          </a:p>
+        </p:txBody>
+      </p:sp>
+      <p:pic>
+        <p:nvPicPr>
+          <p:cNvPr id="5" name="Picture 4">
+            <a:extLst>
+              <a:ext uri="{FF2B5EF4-FFF2-40B4-BE49-F238E27FC236}">
+                <a16:creationId xmlns:a16="http://schemas.microsoft.com/office/drawing/2014/main" id="{2E48ADB1-7DC7-7642-B8F1-89EC2B3904A5}"/>
+              </a:ext>
+            </a:extLst>
+          </p:cNvPr>
+          <p:cNvPicPr>
+            <a:picLocks noChangeAspect="1"/>
+          </p:cNvPicPr>
+          <p:nvPr/>
+        </p:nvPicPr>
+        <p:blipFill>
+          <a:blip r:embed="rId2"/>
+          <a:srcRect/>
+          <a:stretch/>
+        </p:blipFill>
+        <p:spPr>
+          <a:xfrm>
+            <a:off x="429768" y="1747238"/>
+            <a:ext cx="6704889" cy="4469926"/>
+          </a:xfrm>
+          <a:prstGeom prst="rect">
+            <a:avLst/>
+          </a:prstGeom>
+        </p:spPr>
+      </p:pic>
+      <p:sp>
+        <p:nvSpPr>
+          <p:cNvPr id="7" name="Content Placeholder 6">
+            <a:extLst>
+              <a:ext uri="{FF2B5EF4-FFF2-40B4-BE49-F238E27FC236}">
+                <a16:creationId xmlns:a16="http://schemas.microsoft.com/office/drawing/2014/main" id="{27BAADB3-00A2-0144-9CAC-FA699A89F9E5}"/>
+              </a:ext>
+            </a:extLst>
+          </p:cNvPr>
+          <p:cNvSpPr>
+            <a:spLocks noGrp="1"/>
+          </p:cNvSpPr>
+          <p:nvPr>
+            <p:ph idx="1"/>
+          </p:nvPr>
+        </p:nvSpPr>
+        <p:spPr>
+          <a:xfrm>
+            <a:off x="7271656" y="1629992"/>
+            <a:ext cx="3946289" cy="4587173"/>
+          </a:xfrm>
+        </p:spPr>
+        <p:txBody>
+          <a:bodyPr vert="horz" lIns="91440" tIns="45720" rIns="91440" bIns="45720" rtlCol="0" anchor="ctr">
+            <a:normAutofit/>
+          </a:bodyPr>
+          <a:lstStyle/>
+          <a:p>
+            <a:pPr marL="285750"/>
+            <a:endParaRPr lang="en-US" sz="1800" dirty="0"/>
+          </a:p>
+          <a:p>
+            <a:pPr marL="285750"/>
+            <a:r>
+              <a:rPr lang="en-US" sz="1800" dirty="0"/>
+              <a:t>This scatterplot shows the average daily temperature vs daily change in active cases for Iran. (datapoints where daily change = 0 has been removed, temperature data was for Teheran, Iran)</a:t>
+            </a:r>
+          </a:p>
+          <a:p>
+            <a:pPr marL="285750"/>
+            <a:r>
+              <a:rPr lang="en-US" sz="1800" dirty="0"/>
+              <a:t>Linear regression analysis for this country shows a slight negative correlation between temperature and daily change in the number of active cases.</a:t>
+            </a:r>
+          </a:p>
+          <a:p>
+            <a:pPr marL="57150" indent="0">
+              <a:buNone/>
+            </a:pPr>
+            <a:endParaRPr lang="en-US" sz="1800" dirty="0"/>
+          </a:p>
+        </p:txBody>
+      </p:sp>
+    </p:spTree>
+    <p:extLst>
+      <p:ext uri="{BB962C8B-B14F-4D97-AF65-F5344CB8AC3E}">
+        <p14:creationId xmlns:p14="http://schemas.microsoft.com/office/powerpoint/2010/main" val="1974080348"/>
       </p:ext>
     </p:extLst>
   </p:cSld>
@@ -4634,6 +5340,632 @@
     <p:extLst>
       <p:ext uri="{BB962C8B-B14F-4D97-AF65-F5344CB8AC3E}">
         <p14:creationId xmlns:p14="http://schemas.microsoft.com/office/powerpoint/2010/main" val="2344373124"/>
+      </p:ext>
+    </p:extLst>
+  </p:cSld>
+  <p:clrMapOvr>
+    <a:masterClrMapping/>
+  </p:clrMapOvr>
+</p:sld>
+</file>
+
+<file path=ppt/slides/slide20.xml><?xml version="1.0" encoding="utf-8"?>
+<p:sld xmlns:a="http://schemas.openxmlformats.org/drawingml/2006/main" xmlns:r="http://schemas.openxmlformats.org/officeDocument/2006/relationships" xmlns:p="http://schemas.openxmlformats.org/presentationml/2006/main">
+  <p:cSld>
+    <p:spTree>
+      <p:nvGrpSpPr>
+        <p:cNvPr id="1" name=""/>
+        <p:cNvGrpSpPr/>
+        <p:nvPr/>
+      </p:nvGrpSpPr>
+      <p:grpSpPr>
+        <a:xfrm>
+          <a:off x="0" y="0"/>
+          <a:ext cx="0" cy="0"/>
+          <a:chOff x="0" y="0"/>
+          <a:chExt cx="0" cy="0"/>
+        </a:xfrm>
+      </p:grpSpPr>
+      <p:sp>
+        <p:nvSpPr>
+          <p:cNvPr id="2" name="Title 1">
+            <a:extLst>
+              <a:ext uri="{FF2B5EF4-FFF2-40B4-BE49-F238E27FC236}">
+                <a16:creationId xmlns:a16="http://schemas.microsoft.com/office/drawing/2014/main" id="{6C86CADF-F0CD-DC42-8789-D52C508FF3A7}"/>
+              </a:ext>
+            </a:extLst>
+          </p:cNvPr>
+          <p:cNvSpPr>
+            <a:spLocks noGrp="1"/>
+          </p:cNvSpPr>
+          <p:nvPr>
+            <p:ph type="title"/>
+          </p:nvPr>
+        </p:nvSpPr>
+        <p:spPr>
+          <a:xfrm>
+            <a:off x="429768" y="411480"/>
+            <a:ext cx="11201400" cy="1106424"/>
+          </a:xfrm>
+        </p:spPr>
+        <p:txBody>
+          <a:bodyPr vert="horz" lIns="91440" tIns="45720" rIns="91440" bIns="45720" rtlCol="0">
+            <a:normAutofit/>
+          </a:bodyPr>
+          <a:lstStyle/>
+          <a:p>
+            <a:r>
+              <a:rPr lang="en-US" sz="3600" b="1" dirty="0"/>
+              <a:t>It has been claimed that the spread of the disease is slowed down as the temperature rises, is this true?</a:t>
+            </a:r>
+          </a:p>
+        </p:txBody>
+      </p:sp>
+      <p:pic>
+        <p:nvPicPr>
+          <p:cNvPr id="5" name="Picture 4">
+            <a:extLst>
+              <a:ext uri="{FF2B5EF4-FFF2-40B4-BE49-F238E27FC236}">
+                <a16:creationId xmlns:a16="http://schemas.microsoft.com/office/drawing/2014/main" id="{2E48ADB1-7DC7-7642-B8F1-89EC2B3904A5}"/>
+              </a:ext>
+            </a:extLst>
+          </p:cNvPr>
+          <p:cNvPicPr>
+            <a:picLocks noChangeAspect="1"/>
+          </p:cNvPicPr>
+          <p:nvPr/>
+        </p:nvPicPr>
+        <p:blipFill>
+          <a:blip r:embed="rId2"/>
+          <a:srcRect/>
+          <a:stretch/>
+        </p:blipFill>
+        <p:spPr>
+          <a:xfrm>
+            <a:off x="429768" y="1747238"/>
+            <a:ext cx="6704890" cy="4469927"/>
+          </a:xfrm>
+          <a:prstGeom prst="rect">
+            <a:avLst/>
+          </a:prstGeom>
+        </p:spPr>
+      </p:pic>
+      <p:sp>
+        <p:nvSpPr>
+          <p:cNvPr id="7" name="Content Placeholder 6">
+            <a:extLst>
+              <a:ext uri="{FF2B5EF4-FFF2-40B4-BE49-F238E27FC236}">
+                <a16:creationId xmlns:a16="http://schemas.microsoft.com/office/drawing/2014/main" id="{27BAADB3-00A2-0144-9CAC-FA699A89F9E5}"/>
+              </a:ext>
+            </a:extLst>
+          </p:cNvPr>
+          <p:cNvSpPr>
+            <a:spLocks noGrp="1"/>
+          </p:cNvSpPr>
+          <p:nvPr>
+            <p:ph idx="1"/>
+          </p:nvPr>
+        </p:nvSpPr>
+        <p:spPr>
+          <a:xfrm>
+            <a:off x="7271656" y="1629992"/>
+            <a:ext cx="3946289" cy="4587173"/>
+          </a:xfrm>
+        </p:spPr>
+        <p:txBody>
+          <a:bodyPr vert="horz" lIns="91440" tIns="45720" rIns="91440" bIns="45720" rtlCol="0" anchor="ctr">
+            <a:normAutofit/>
+          </a:bodyPr>
+          <a:lstStyle/>
+          <a:p>
+            <a:pPr marL="285750"/>
+            <a:endParaRPr lang="en-US" sz="1800" dirty="0"/>
+          </a:p>
+          <a:p>
+            <a:pPr marL="285750"/>
+            <a:r>
+              <a:rPr lang="en-US" sz="1800" dirty="0"/>
+              <a:t>This scatterplot shows the average daily temperature vs daily change in active cases for South Korea. (datapoints where daily change = 0 has been removed, temperature data was for Seoul, Korea)</a:t>
+            </a:r>
+          </a:p>
+          <a:p>
+            <a:pPr marL="285750"/>
+            <a:r>
+              <a:rPr lang="en-US" sz="1800" dirty="0"/>
+              <a:t>Linear regression analysis for this country shows a very very slight negative correlation between temperature and daily change in the number of active cases.</a:t>
+            </a:r>
+          </a:p>
+          <a:p>
+            <a:pPr marL="57150" indent="0">
+              <a:buNone/>
+            </a:pPr>
+            <a:endParaRPr lang="en-US" sz="1800" dirty="0"/>
+          </a:p>
+        </p:txBody>
+      </p:sp>
+    </p:spTree>
+    <p:extLst>
+      <p:ext uri="{BB962C8B-B14F-4D97-AF65-F5344CB8AC3E}">
+        <p14:creationId xmlns:p14="http://schemas.microsoft.com/office/powerpoint/2010/main" val="2623499795"/>
+      </p:ext>
+    </p:extLst>
+  </p:cSld>
+  <p:clrMapOvr>
+    <a:masterClrMapping/>
+  </p:clrMapOvr>
+</p:sld>
+</file>
+
+<file path=ppt/slides/slide21.xml><?xml version="1.0" encoding="utf-8"?>
+<p:sld xmlns:a="http://schemas.openxmlformats.org/drawingml/2006/main" xmlns:r="http://schemas.openxmlformats.org/officeDocument/2006/relationships" xmlns:p="http://schemas.openxmlformats.org/presentationml/2006/main">
+  <p:cSld>
+    <p:spTree>
+      <p:nvGrpSpPr>
+        <p:cNvPr id="1" name=""/>
+        <p:cNvGrpSpPr/>
+        <p:nvPr/>
+      </p:nvGrpSpPr>
+      <p:grpSpPr>
+        <a:xfrm>
+          <a:off x="0" y="0"/>
+          <a:ext cx="0" cy="0"/>
+          <a:chOff x="0" y="0"/>
+          <a:chExt cx="0" cy="0"/>
+        </a:xfrm>
+      </p:grpSpPr>
+      <p:sp>
+        <p:nvSpPr>
+          <p:cNvPr id="2" name="Title 1">
+            <a:extLst>
+              <a:ext uri="{FF2B5EF4-FFF2-40B4-BE49-F238E27FC236}">
+                <a16:creationId xmlns:a16="http://schemas.microsoft.com/office/drawing/2014/main" id="{6C86CADF-F0CD-DC42-8789-D52C508FF3A7}"/>
+              </a:ext>
+            </a:extLst>
+          </p:cNvPr>
+          <p:cNvSpPr>
+            <a:spLocks noGrp="1"/>
+          </p:cNvSpPr>
+          <p:nvPr>
+            <p:ph type="title"/>
+          </p:nvPr>
+        </p:nvSpPr>
+        <p:spPr>
+          <a:xfrm>
+            <a:off x="429768" y="411480"/>
+            <a:ext cx="11201400" cy="1106424"/>
+          </a:xfrm>
+        </p:spPr>
+        <p:txBody>
+          <a:bodyPr vert="horz" lIns="91440" tIns="45720" rIns="91440" bIns="45720" rtlCol="0">
+            <a:normAutofit/>
+          </a:bodyPr>
+          <a:lstStyle/>
+          <a:p>
+            <a:r>
+              <a:rPr lang="en-US" sz="3600" b="1" dirty="0"/>
+              <a:t>It has been claimed that the spread of the disease is slowed down as the temperature rises, is this true?</a:t>
+            </a:r>
+          </a:p>
+        </p:txBody>
+      </p:sp>
+      <p:pic>
+        <p:nvPicPr>
+          <p:cNvPr id="5" name="Picture 4">
+            <a:extLst>
+              <a:ext uri="{FF2B5EF4-FFF2-40B4-BE49-F238E27FC236}">
+                <a16:creationId xmlns:a16="http://schemas.microsoft.com/office/drawing/2014/main" id="{2E48ADB1-7DC7-7642-B8F1-89EC2B3904A5}"/>
+              </a:ext>
+            </a:extLst>
+          </p:cNvPr>
+          <p:cNvPicPr>
+            <a:picLocks noChangeAspect="1"/>
+          </p:cNvPicPr>
+          <p:nvPr/>
+        </p:nvPicPr>
+        <p:blipFill>
+          <a:blip r:embed="rId2"/>
+          <a:srcRect/>
+          <a:stretch/>
+        </p:blipFill>
+        <p:spPr>
+          <a:xfrm>
+            <a:off x="429768" y="1747238"/>
+            <a:ext cx="6704889" cy="4469926"/>
+          </a:xfrm>
+          <a:prstGeom prst="rect">
+            <a:avLst/>
+          </a:prstGeom>
+        </p:spPr>
+      </p:pic>
+      <p:sp>
+        <p:nvSpPr>
+          <p:cNvPr id="7" name="Content Placeholder 6">
+            <a:extLst>
+              <a:ext uri="{FF2B5EF4-FFF2-40B4-BE49-F238E27FC236}">
+                <a16:creationId xmlns:a16="http://schemas.microsoft.com/office/drawing/2014/main" id="{27BAADB3-00A2-0144-9CAC-FA699A89F9E5}"/>
+              </a:ext>
+            </a:extLst>
+          </p:cNvPr>
+          <p:cNvSpPr>
+            <a:spLocks noGrp="1"/>
+          </p:cNvSpPr>
+          <p:nvPr>
+            <p:ph idx="1"/>
+          </p:nvPr>
+        </p:nvSpPr>
+        <p:spPr>
+          <a:xfrm>
+            <a:off x="7271656" y="1629992"/>
+            <a:ext cx="3946289" cy="4587173"/>
+          </a:xfrm>
+        </p:spPr>
+        <p:txBody>
+          <a:bodyPr vert="horz" lIns="91440" tIns="45720" rIns="91440" bIns="45720" rtlCol="0" anchor="ctr">
+            <a:normAutofit/>
+          </a:bodyPr>
+          <a:lstStyle/>
+          <a:p>
+            <a:pPr marL="285750"/>
+            <a:endParaRPr lang="en-US" sz="1800" dirty="0"/>
+          </a:p>
+          <a:p>
+            <a:pPr marL="285750"/>
+            <a:r>
+              <a:rPr lang="en-US" sz="1800" dirty="0"/>
+              <a:t>This scatterplot shows the average daily temperature vs daily change in active cases for Beijing, China. (datapoints where daily change = 0 has been removed)</a:t>
+            </a:r>
+          </a:p>
+          <a:p>
+            <a:pPr marL="285750"/>
+            <a:r>
+              <a:rPr lang="en-US" sz="1800" dirty="0"/>
+              <a:t>Linear regression analysis for this country shows a very very slight negative correlation between temperature and daily change in the number of active cases.</a:t>
+            </a:r>
+          </a:p>
+          <a:p>
+            <a:pPr marL="57150" indent="0">
+              <a:buNone/>
+            </a:pPr>
+            <a:endParaRPr lang="en-US" sz="1800" dirty="0"/>
+          </a:p>
+        </p:txBody>
+      </p:sp>
+    </p:spTree>
+    <p:extLst>
+      <p:ext uri="{BB962C8B-B14F-4D97-AF65-F5344CB8AC3E}">
+        <p14:creationId xmlns:p14="http://schemas.microsoft.com/office/powerpoint/2010/main" val="238845737"/>
+      </p:ext>
+    </p:extLst>
+  </p:cSld>
+  <p:clrMapOvr>
+    <a:masterClrMapping/>
+  </p:clrMapOvr>
+</p:sld>
+</file>
+
+<file path=ppt/slides/slide22.xml><?xml version="1.0" encoding="utf-8"?>
+<p:sld xmlns:a="http://schemas.openxmlformats.org/drawingml/2006/main" xmlns:r="http://schemas.openxmlformats.org/officeDocument/2006/relationships" xmlns:p="http://schemas.openxmlformats.org/presentationml/2006/main">
+  <p:cSld>
+    <p:spTree>
+      <p:nvGrpSpPr>
+        <p:cNvPr id="1" name=""/>
+        <p:cNvGrpSpPr/>
+        <p:nvPr/>
+      </p:nvGrpSpPr>
+      <p:grpSpPr>
+        <a:xfrm>
+          <a:off x="0" y="0"/>
+          <a:ext cx="0" cy="0"/>
+          <a:chOff x="0" y="0"/>
+          <a:chExt cx="0" cy="0"/>
+        </a:xfrm>
+      </p:grpSpPr>
+      <p:sp>
+        <p:nvSpPr>
+          <p:cNvPr id="2" name="Title 1">
+            <a:extLst>
+              <a:ext uri="{FF2B5EF4-FFF2-40B4-BE49-F238E27FC236}">
+                <a16:creationId xmlns:a16="http://schemas.microsoft.com/office/drawing/2014/main" id="{6C86CADF-F0CD-DC42-8789-D52C508FF3A7}"/>
+              </a:ext>
+            </a:extLst>
+          </p:cNvPr>
+          <p:cNvSpPr>
+            <a:spLocks noGrp="1"/>
+          </p:cNvSpPr>
+          <p:nvPr>
+            <p:ph type="title"/>
+          </p:nvPr>
+        </p:nvSpPr>
+        <p:spPr>
+          <a:xfrm>
+            <a:off x="429768" y="411480"/>
+            <a:ext cx="11201400" cy="1106424"/>
+          </a:xfrm>
+        </p:spPr>
+        <p:txBody>
+          <a:bodyPr vert="horz" lIns="91440" tIns="45720" rIns="91440" bIns="45720" rtlCol="0">
+            <a:normAutofit/>
+          </a:bodyPr>
+          <a:lstStyle/>
+          <a:p>
+            <a:r>
+              <a:rPr lang="en-US" sz="3600" b="1" dirty="0"/>
+              <a:t>It has been claimed that the spread of the disease is slowed down as the temperature rises, is this true?</a:t>
+            </a:r>
+          </a:p>
+        </p:txBody>
+      </p:sp>
+      <p:pic>
+        <p:nvPicPr>
+          <p:cNvPr id="5" name="Picture 4">
+            <a:extLst>
+              <a:ext uri="{FF2B5EF4-FFF2-40B4-BE49-F238E27FC236}">
+                <a16:creationId xmlns:a16="http://schemas.microsoft.com/office/drawing/2014/main" id="{2E48ADB1-7DC7-7642-B8F1-89EC2B3904A5}"/>
+              </a:ext>
+            </a:extLst>
+          </p:cNvPr>
+          <p:cNvPicPr>
+            <a:picLocks noChangeAspect="1"/>
+          </p:cNvPicPr>
+          <p:nvPr/>
+        </p:nvPicPr>
+        <p:blipFill>
+          <a:blip r:embed="rId2"/>
+          <a:srcRect/>
+          <a:stretch/>
+        </p:blipFill>
+        <p:spPr>
+          <a:xfrm>
+            <a:off x="429768" y="1747238"/>
+            <a:ext cx="6704889" cy="4469926"/>
+          </a:xfrm>
+          <a:prstGeom prst="rect">
+            <a:avLst/>
+          </a:prstGeom>
+        </p:spPr>
+      </p:pic>
+      <p:sp>
+        <p:nvSpPr>
+          <p:cNvPr id="7" name="Content Placeholder 6">
+            <a:extLst>
+              <a:ext uri="{FF2B5EF4-FFF2-40B4-BE49-F238E27FC236}">
+                <a16:creationId xmlns:a16="http://schemas.microsoft.com/office/drawing/2014/main" id="{27BAADB3-00A2-0144-9CAC-FA699A89F9E5}"/>
+              </a:ext>
+            </a:extLst>
+          </p:cNvPr>
+          <p:cNvSpPr>
+            <a:spLocks noGrp="1"/>
+          </p:cNvSpPr>
+          <p:nvPr>
+            <p:ph idx="1"/>
+          </p:nvPr>
+        </p:nvSpPr>
+        <p:spPr>
+          <a:xfrm>
+            <a:off x="7271656" y="1629992"/>
+            <a:ext cx="3946289" cy="4587173"/>
+          </a:xfrm>
+        </p:spPr>
+        <p:txBody>
+          <a:bodyPr vert="horz" lIns="91440" tIns="45720" rIns="91440" bIns="45720" rtlCol="0" anchor="ctr">
+            <a:normAutofit/>
+          </a:bodyPr>
+          <a:lstStyle/>
+          <a:p>
+            <a:pPr marL="285750"/>
+            <a:endParaRPr lang="en-US" sz="1800" dirty="0"/>
+          </a:p>
+          <a:p>
+            <a:pPr marL="285750"/>
+            <a:r>
+              <a:rPr lang="en-US" sz="1800" dirty="0"/>
+              <a:t>This scatterplot shows the average daily temperature vs daily change in active cases for Sydney Australia. (datapoints where daily change = 0 has been removed)</a:t>
+            </a:r>
+          </a:p>
+          <a:p>
+            <a:pPr marL="285750"/>
+            <a:r>
+              <a:rPr lang="en-US" sz="1800" dirty="0"/>
+              <a:t>Linear regression analysis for this country shows a very very slight positive correlation between temperature and daily change in the number of active cases.</a:t>
+            </a:r>
+          </a:p>
+          <a:p>
+            <a:pPr marL="57150" indent="0">
+              <a:buNone/>
+            </a:pPr>
+            <a:endParaRPr lang="en-US" sz="1800" dirty="0"/>
+          </a:p>
+        </p:txBody>
+      </p:sp>
+    </p:spTree>
+    <p:extLst>
+      <p:ext uri="{BB962C8B-B14F-4D97-AF65-F5344CB8AC3E}">
+        <p14:creationId xmlns:p14="http://schemas.microsoft.com/office/powerpoint/2010/main" val="2721343253"/>
+      </p:ext>
+    </p:extLst>
+  </p:cSld>
+  <p:clrMapOvr>
+    <a:masterClrMapping/>
+  </p:clrMapOvr>
+</p:sld>
+</file>
+
+<file path=ppt/slides/slide23.xml><?xml version="1.0" encoding="utf-8"?>
+<p:sld xmlns:a="http://schemas.openxmlformats.org/drawingml/2006/main" xmlns:r="http://schemas.openxmlformats.org/officeDocument/2006/relationships" xmlns:p="http://schemas.openxmlformats.org/presentationml/2006/main">
+  <p:cSld>
+    <p:spTree>
+      <p:nvGrpSpPr>
+        <p:cNvPr id="1" name=""/>
+        <p:cNvGrpSpPr/>
+        <p:nvPr/>
+      </p:nvGrpSpPr>
+      <p:grpSpPr>
+        <a:xfrm>
+          <a:off x="0" y="0"/>
+          <a:ext cx="0" cy="0"/>
+          <a:chOff x="0" y="0"/>
+          <a:chExt cx="0" cy="0"/>
+        </a:xfrm>
+      </p:grpSpPr>
+      <p:sp>
+        <p:nvSpPr>
+          <p:cNvPr id="2" name="Title 1">
+            <a:extLst>
+              <a:ext uri="{FF2B5EF4-FFF2-40B4-BE49-F238E27FC236}">
+                <a16:creationId xmlns:a16="http://schemas.microsoft.com/office/drawing/2014/main" id="{6C86CADF-F0CD-DC42-8789-D52C508FF3A7}"/>
+              </a:ext>
+            </a:extLst>
+          </p:cNvPr>
+          <p:cNvSpPr>
+            <a:spLocks noGrp="1"/>
+          </p:cNvSpPr>
+          <p:nvPr>
+            <p:ph type="title"/>
+          </p:nvPr>
+        </p:nvSpPr>
+        <p:spPr>
+          <a:xfrm>
+            <a:off x="429768" y="411480"/>
+            <a:ext cx="11201400" cy="1106424"/>
+          </a:xfrm>
+        </p:spPr>
+        <p:txBody>
+          <a:bodyPr vert="horz" lIns="91440" tIns="45720" rIns="91440" bIns="45720" rtlCol="0">
+            <a:normAutofit/>
+          </a:bodyPr>
+          <a:lstStyle/>
+          <a:p>
+            <a:r>
+              <a:rPr lang="en-US" sz="3600" b="1" dirty="0"/>
+              <a:t>It has been claimed that the spread of the disease is slowed down as the temperature rises, is this true?</a:t>
+            </a:r>
+          </a:p>
+        </p:txBody>
+      </p:sp>
+      <p:pic>
+        <p:nvPicPr>
+          <p:cNvPr id="5" name="Picture 4">
+            <a:extLst>
+              <a:ext uri="{FF2B5EF4-FFF2-40B4-BE49-F238E27FC236}">
+                <a16:creationId xmlns:a16="http://schemas.microsoft.com/office/drawing/2014/main" id="{2E48ADB1-7DC7-7642-B8F1-89EC2B3904A5}"/>
+              </a:ext>
+            </a:extLst>
+          </p:cNvPr>
+          <p:cNvPicPr>
+            <a:picLocks noChangeAspect="1"/>
+          </p:cNvPicPr>
+          <p:nvPr/>
+        </p:nvPicPr>
+        <p:blipFill>
+          <a:blip r:embed="rId2"/>
+          <a:srcRect/>
+          <a:stretch/>
+        </p:blipFill>
+        <p:spPr>
+          <a:xfrm>
+            <a:off x="429768" y="1747238"/>
+            <a:ext cx="6704889" cy="4469926"/>
+          </a:xfrm>
+          <a:prstGeom prst="rect">
+            <a:avLst/>
+          </a:prstGeom>
+        </p:spPr>
+      </p:pic>
+      <p:sp>
+        <p:nvSpPr>
+          <p:cNvPr id="7" name="Content Placeholder 6">
+            <a:extLst>
+              <a:ext uri="{FF2B5EF4-FFF2-40B4-BE49-F238E27FC236}">
+                <a16:creationId xmlns:a16="http://schemas.microsoft.com/office/drawing/2014/main" id="{27BAADB3-00A2-0144-9CAC-FA699A89F9E5}"/>
+              </a:ext>
+            </a:extLst>
+          </p:cNvPr>
+          <p:cNvSpPr>
+            <a:spLocks noGrp="1"/>
+          </p:cNvSpPr>
+          <p:nvPr>
+            <p:ph idx="1"/>
+          </p:nvPr>
+        </p:nvSpPr>
+        <p:spPr>
+          <a:xfrm>
+            <a:off x="6770914" y="1629992"/>
+            <a:ext cx="4860254" cy="4587173"/>
+          </a:xfrm>
+        </p:spPr>
+        <p:txBody>
+          <a:bodyPr vert="horz" lIns="91440" tIns="45720" rIns="91440" bIns="45720" rtlCol="0" anchor="ctr">
+            <a:normAutofit/>
+          </a:bodyPr>
+          <a:lstStyle/>
+          <a:p>
+            <a:pPr marL="285750"/>
+            <a:endParaRPr lang="en-US" sz="1800" dirty="0"/>
+          </a:p>
+          <a:p>
+            <a:pPr marL="285750"/>
+            <a:r>
+              <a:rPr lang="en-US" sz="1800" dirty="0"/>
+              <a:t>This scatterplot shows the average daily temperature vs daily change in active cases for all the aforementioned locations. (datapoints where daily change = 0 has been removed)</a:t>
+            </a:r>
+          </a:p>
+          <a:p>
+            <a:pPr marL="285750"/>
+            <a:r>
+              <a:rPr lang="en-US" sz="1800" dirty="0"/>
+              <a:t>Linear regression analysis shows a very slight negative correlation between temperature and daily change in the number of active cases.</a:t>
+            </a:r>
+          </a:p>
+          <a:p>
+            <a:pPr marL="285750"/>
+            <a:r>
+              <a:rPr lang="en-US" sz="1800" dirty="0"/>
+              <a:t>However, it’s important to note that the </a:t>
+            </a:r>
+            <a:r>
+              <a:rPr lang="en-US" sz="1800" dirty="0" err="1"/>
+              <a:t>Openweatherapi</a:t>
+            </a:r>
+            <a:r>
+              <a:rPr lang="en-US" sz="1800" dirty="0"/>
+              <a:t> does not provide historical temperature data to free users, so the dataset probably does not provide enough significance</a:t>
+            </a:r>
+          </a:p>
+          <a:p>
+            <a:pPr marL="285750"/>
+            <a:r>
+              <a:rPr lang="en-US" sz="1800" b="1" u="sng" dirty="0"/>
+              <a:t>Conclusion</a:t>
+            </a:r>
+            <a:r>
+              <a:rPr lang="en-US" sz="1800" b="1" dirty="0"/>
+              <a:t>: </a:t>
+            </a:r>
+            <a:r>
+              <a:rPr lang="en-US" sz="1800" dirty="0"/>
+              <a:t>It may be true, we would have to look at more data, read into the pricing document for </a:t>
+            </a:r>
+            <a:r>
+              <a:rPr lang="en-US" sz="1800" dirty="0" err="1"/>
+              <a:t>api</a:t>
+            </a:r>
+            <a:r>
+              <a:rPr lang="en-US" sz="1800" dirty="0"/>
+              <a:t> requests more carefully before you start your project.</a:t>
+            </a:r>
+          </a:p>
+          <a:p>
+            <a:pPr marL="57150" indent="0">
+              <a:buNone/>
+            </a:pPr>
+            <a:endParaRPr lang="en-US" sz="1800" dirty="0"/>
+          </a:p>
+        </p:txBody>
+      </p:sp>
+    </p:spTree>
+    <p:extLst>
+      <p:ext uri="{BB962C8B-B14F-4D97-AF65-F5344CB8AC3E}">
+        <p14:creationId xmlns:p14="http://schemas.microsoft.com/office/powerpoint/2010/main" val="226695164"/>
       </p:ext>
     </p:extLst>
   </p:cSld>

</xml_diff>